<commit_message>
RCAN code and MULTISPECTRAL
</commit_message>
<xml_diff>
--- a/1228_Colab.pptx
+++ b/1228_Colab.pptx
@@ -231,7 +231,7 @@
           <a:p>
             <a:fld id="{595372B6-6ABB-40DF-906D-DFEF92D58FCB}" type="datetimeFigureOut">
               <a:rPr lang="ko-KR" altLang="en-US" smtClean="0"/>
-              <a:t>2019. 1. 3.</a:t>
+              <a:t>2019. 1. 9.</a:t>
             </a:fld>
             <a:endParaRPr lang="ko-KR" altLang="en-US"/>
           </a:p>
@@ -637,7 +637,7 @@
                 </a:solidFill>
               </a:rPr>
               <a:pPr/>
-              <a:t>2019. 1. 3.</a:t>
+              <a:t>2019. 1. 9.</a:t>
             </a:fld>
             <a:endParaRPr lang="ko-KR" altLang="en-US" dirty="0">
               <a:solidFill>
@@ -839,7 +839,7 @@
                 </a:solidFill>
               </a:rPr>
               <a:pPr/>
-              <a:t>2019. 1. 3.</a:t>
+              <a:t>2019. 1. 9.</a:t>
             </a:fld>
             <a:endParaRPr lang="ko-KR" altLang="en-US" dirty="0">
               <a:solidFill>
@@ -1051,7 +1051,7 @@
                 </a:solidFill>
               </a:rPr>
               <a:pPr/>
-              <a:t>2019. 1. 3.</a:t>
+              <a:t>2019. 1. 9.</a:t>
             </a:fld>
             <a:endParaRPr lang="ko-KR" altLang="en-US" dirty="0">
               <a:solidFill>
@@ -1253,7 +1253,7 @@
                 </a:solidFill>
               </a:rPr>
               <a:pPr/>
-              <a:t>2019. 1. 3.</a:t>
+              <a:t>2019. 1. 9.</a:t>
             </a:fld>
             <a:endParaRPr lang="ko-KR" altLang="en-US" dirty="0">
               <a:solidFill>
@@ -1529,7 +1529,7 @@
                 </a:solidFill>
               </a:rPr>
               <a:pPr/>
-              <a:t>2019. 1. 3.</a:t>
+              <a:t>2019. 1. 9.</a:t>
             </a:fld>
             <a:endParaRPr lang="ko-KR" altLang="en-US" dirty="0">
               <a:solidFill>
@@ -1793,7 +1793,7 @@
                 </a:solidFill>
               </a:rPr>
               <a:pPr/>
-              <a:t>2019. 1. 3.</a:t>
+              <a:t>2019. 1. 9.</a:t>
             </a:fld>
             <a:endParaRPr lang="ko-KR" altLang="en-US" dirty="0">
               <a:solidFill>
@@ -2192,7 +2192,7 @@
                 </a:solidFill>
               </a:rPr>
               <a:pPr/>
-              <a:t>2019. 1. 3.</a:t>
+              <a:t>2019. 1. 9.</a:t>
             </a:fld>
             <a:endParaRPr lang="ko-KR" altLang="en-US" dirty="0">
               <a:solidFill>
@@ -2342,7 +2342,7 @@
                 </a:solidFill>
               </a:rPr>
               <a:pPr/>
-              <a:t>2019. 1. 3.</a:t>
+              <a:t>2019. 1. 9.</a:t>
             </a:fld>
             <a:endParaRPr lang="ko-KR" altLang="en-US" dirty="0">
               <a:solidFill>
@@ -2469,7 +2469,7 @@
                 </a:solidFill>
               </a:rPr>
               <a:pPr/>
-              <a:t>2019. 1. 3.</a:t>
+              <a:t>2019. 1. 9.</a:t>
             </a:fld>
             <a:endParaRPr lang="ko-KR" altLang="en-US" dirty="0">
               <a:solidFill>
@@ -2778,7 +2778,7 @@
                 </a:solidFill>
               </a:rPr>
               <a:pPr/>
-              <a:t>2019. 1. 3.</a:t>
+              <a:t>2019. 1. 9.</a:t>
             </a:fld>
             <a:endParaRPr lang="ko-KR" altLang="en-US" dirty="0">
               <a:solidFill>
@@ -3067,7 +3067,7 @@
                 </a:solidFill>
               </a:rPr>
               <a:pPr/>
-              <a:t>2019. 1. 3.</a:t>
+              <a:t>2019. 1. 9.</a:t>
             </a:fld>
             <a:endParaRPr lang="ko-KR" altLang="en-US" dirty="0">
               <a:solidFill>
@@ -3312,7 +3312,7 @@
                 </a:solidFill>
               </a:rPr>
               <a:pPr/>
-              <a:t>2019. 1. 3.</a:t>
+              <a:t>2019. 1. 9.</a:t>
             </a:fld>
             <a:endParaRPr lang="ko-KR" altLang="en-US" dirty="0">
               <a:solidFill>

</xml_diff>